<commit_message>
fixing sbatch command line args
</commit_message>
<xml_diff>
--- a/Slurm_Lunchbox.pptx
+++ b/Slurm_Lunchbox.pptx
@@ -15061,13 +15061,13 @@
   <p:clrMapOvr>
     <a:masterClrMapping/>
   </p:clrMapOvr>
-  <mc:AlternateContent xmlns:mc="http://schemas.openxmlformats.org/markup-compatibility/2006">
-    <mc:Choice xmlns:p14="http://schemas.microsoft.com/office/powerpoint/2010/main" Requires="p14">
+  <mc:AlternateContent xmlns:mc="http://schemas.openxmlformats.org/markup-compatibility/2006" xmlns:p14="http://schemas.microsoft.com/office/powerpoint/2010/main">
+    <mc:Choice Requires="p14">
       <p:transition spd="slow" p14:dur="800">
         <p14:flythrough dir="out"/>
       </p:transition>
     </mc:Choice>
-    <mc:Fallback>
+    <mc:Fallback xmlns="">
       <p:transition spd="slow">
         <p:fade/>
       </p:transition>
@@ -19771,7 +19771,7 @@
                   <a:ea typeface="+mn-lt"/>
                   <a:cs typeface="Courier New" panose="02070309020205020404" pitchFamily="49" charset="0"/>
                 </a:rPr>
-                <a:t> –n 1 --</a:t>
+                <a:t> --</a:t>
               </a:r>
               <a:r>
                 <a:rPr lang="en-US" sz="1800" dirty="0" err="1">
@@ -19855,7 +19855,7 @@
                 <a:rPr lang="en-US" sz="1800" dirty="0">
                   <a:ea typeface="新細明體"/>
                 </a:rPr>
-                <a:t> </a:t>
+                <a:t>  </a:t>
               </a:r>
               <a:r>
                 <a:rPr lang="en-US" sz="1800" dirty="0" err="1">
@@ -19881,33 +19881,7 @@
                   <a:ea typeface="新細明體"/>
                   <a:cs typeface="Courier New"/>
                 </a:rPr>
-                <a:t> –n 1 &lt;</a:t>
-              </a:r>
-              <a:r>
-                <a:rPr lang="en-US" sz="1800" dirty="0" err="1">
-                  <a:solidFill>
-                    <a:schemeClr val="accent6">
-                      <a:lumMod val="50000"/>
-                    </a:schemeClr>
-                  </a:solidFill>
-                  <a:latin typeface="Courier New"/>
-                  <a:ea typeface="新細明體"/>
-                  <a:cs typeface="Courier New"/>
-                </a:rPr>
-                <a:t>other_options</a:t>
-              </a:r>
-              <a:r>
-                <a:rPr lang="en-US" sz="1800" dirty="0">
-                  <a:solidFill>
-                    <a:schemeClr val="accent6">
-                      <a:lumMod val="50000"/>
-                    </a:schemeClr>
-                  </a:solidFill>
-                  <a:latin typeface="Courier New"/>
-                  <a:ea typeface="新細明體"/>
-                  <a:cs typeface="Courier New"/>
-                </a:rPr>
-                <a:t>&gt; –p interactive –M </a:t>
+                <a:t> –n 8 –t 16:00:00 –p interactive –M </a:t>
               </a:r>
               <a:r>
                 <a:rPr lang="en-US" sz="1800" dirty="0" err="1">
@@ -19959,7 +19933,7 @@
                   <a:ea typeface="新細明體"/>
                   <a:cs typeface="Courier New"/>
                 </a:rPr>
-                <a:t> /bin/bash –l</a:t>
+                <a:t> /bin/bash –l # max possible</a:t>
               </a:r>
               <a:br>
                 <a:rPr lang="en-US" sz="1800" dirty="0">
@@ -20010,7 +19984,7 @@
                   <a:ea typeface="新細明體"/>
                   <a:cs typeface="Courier New"/>
                 </a:rPr>
-                <a:t> –n 1 --tasks-per-node 36 --</a:t>
+                <a:t> --tasks-per-node 36 --</a:t>
               </a:r>
               <a:r>
                 <a:rPr lang="en-US" sz="1800" dirty="0" err="1">
@@ -20451,7 +20425,7 @@
                   <a:latin typeface="Courier New" panose="02070309020205020404" pitchFamily="49" charset="0"/>
                   <a:cs typeface="Courier New" panose="02070309020205020404" pitchFamily="49" charset="0"/>
                 </a:rPr>
-                <a:t> –n 1 –</a:t>
+                <a:t> –N 1 –</a:t>
               </a:r>
               <a:r>
                 <a:rPr lang="en-US" dirty="0" err="1">
@@ -41969,73 +41943,14 @@
 
 <file path=customXml/item1.xml><?xml version="1.0" encoding="utf-8"?>
 <?mso-contentType ?>
-<spe:Receivers xmlns:spe="http://schemas.microsoft.com/sharepoint/events">
-  <Receiver>
-    <Name>Document ID Generator</Name>
-    <Synchronization>Synchronous</Synchronization>
-    <Type>10001</Type>
-    <SequenceNumber>1000</SequenceNumber>
-    <Assembly>Microsoft.Office.DocumentManagement, Version=14.0.0.0, Culture=neutral, PublicKeyToken=71e9bce111e9429c</Assembly>
-    <Class>Microsoft.Office.DocumentManagement.Internal.DocIdHandler</Class>
-    <Data/>
-    <Filter/>
-  </Receiver>
-  <Receiver>
-    <Name>Document ID Generator</Name>
-    <Synchronization>Synchronous</Synchronization>
-    <Type>10002</Type>
-    <SequenceNumber>1001</SequenceNumber>
-    <Assembly>Microsoft.Office.DocumentManagement, Version=14.0.0.0, Culture=neutral, PublicKeyToken=71e9bce111e9429c</Assembly>
-    <Class>Microsoft.Office.DocumentManagement.Internal.DocIdHandler</Class>
-    <Data/>
-    <Filter/>
-  </Receiver>
-  <Receiver>
-    <Name>Document ID Generator</Name>
-    <Synchronization>Synchronous</Synchronization>
-    <Type>10004</Type>
-    <SequenceNumber>1002</SequenceNumber>
-    <Assembly>Microsoft.Office.DocumentManagement, Version=14.0.0.0, Culture=neutral, PublicKeyToken=71e9bce111e9429c</Assembly>
-    <Class>Microsoft.Office.DocumentManagement.Internal.DocIdHandler</Class>
-    <Data/>
-    <Filter/>
-  </Receiver>
-  <Receiver>
-    <Name>Document ID Generator</Name>
-    <Synchronization>Synchronous</Synchronization>
-    <Type>10006</Type>
-    <SequenceNumber>1003</SequenceNumber>
-    <Assembly>Microsoft.Office.DocumentManagement, Version=14.0.0.0, Culture=neutral, PublicKeyToken=71e9bce111e9429c</Assembly>
-    <Class>Microsoft.Office.DocumentManagement.Internal.DocIdHandler</Class>
-    <Data/>
-    <Filter/>
-  </Receiver>
-</spe:Receivers>
+<FormTemplates xmlns="http://schemas.microsoft.com/sharepoint/v3/contenttype/forms">
+  <Display>DocumentLibraryForm</Display>
+  <Edit>DocumentLibraryForm</Edit>
+  <New>DocumentLibraryForm</New>
+</FormTemplates>
 </file>
 
 <file path=customXml/item2.xml><?xml version="1.0" encoding="utf-8"?>
-<?mso-contentType ?>
-<customXsn xmlns="http://schemas.microsoft.com/office/2006/metadata/customXsn">
-  <xsnLocation/>
-  <cached>True</cached>
-  <openByDefault>True</openByDefault>
-  <xsnScope>/sites/hpc</xsnScope>
-</customXsn>
-</file>
-
-<file path=customXml/item3.xml><?xml version="1.0" encoding="utf-8"?>
-<p:properties xmlns:p="http://schemas.microsoft.com/office/2006/metadata/properties" xmlns:xsi="http://www.w3.org/2001/XMLSchema-instance" xmlns:pc="http://schemas.microsoft.com/office/infopath/2007/PartnerControls">
-  <documentManagement>
-    <_dlc_DocId xmlns="aff7d12c-bb71-4270-bd29-9c4d45ff3327">346bfafb-41a4-4705-9274-1725a8a4651c</_dlc_DocId>
-    <_dlc_DocIdUrl xmlns="aff7d12c-bb71-4270-bd29-9c4d45ff3327">
-      <Url>https://www.groupware.kuleuven.be/sites/hpc/_layouts/15/DocIdRedir.aspx?ID=346bfafb-41a4-4705-9274-1725a8a4651c</Url>
-      <Description>346bfafb-41a4-4705-9274-1725a8a4651c</Description>
-    </_dlc_DocIdUrl>
-  </documentManagement>
-</p:properties>
-</file>
-
-<file path=customXml/item4.xml><?xml version="1.0" encoding="utf-8"?>
 <ct:contentTypeSchema xmlns:ct="http://schemas.microsoft.com/office/2006/metadata/contentType" xmlns:ma="http://schemas.microsoft.com/office/2006/metadata/properties/metaAttributes" ct:_="" ma:_="" ma:contentTypeName="Document" ma:contentTypeID="0x010100317C36A1CAF973428CFB8DC9B5B73D030400A741C9874CC89F4CB7C7A5AE62CBCD36" ma:contentTypeVersion="2" ma:contentTypeDescription="" ma:contentTypeScope="" ma:versionID="2a5b37c1a06f9995b1548b8fc9b10188">
   <xsd:schema xmlns:xsd="http://www.w3.org/2001/XMLSchema" xmlns:xs="http://www.w3.org/2001/XMLSchema" xmlns:p="http://schemas.microsoft.com/office/2006/metadata/properties" xmlns:ns2="aff7d12c-bb71-4270-bd29-9c4d45ff3327" targetNamespace="http://schemas.microsoft.com/office/2006/metadata/properties" ma:root="true" ma:fieldsID="535495b15c0addd8af32a03863086e70" ns2:_="">
     <xsd:import namespace="aff7d12c-bb71-4270-bd29-9c4d45ff3327"/>
@@ -42180,27 +42095,96 @@
 </ct:contentTypeSchema>
 </file>
 
+<file path=customXml/item3.xml><?xml version="1.0" encoding="utf-8"?>
+<p:properties xmlns:p="http://schemas.microsoft.com/office/2006/metadata/properties" xmlns:xsi="http://www.w3.org/2001/XMLSchema-instance" xmlns:pc="http://schemas.microsoft.com/office/infopath/2007/PartnerControls">
+  <documentManagement>
+    <_dlc_DocId xmlns="aff7d12c-bb71-4270-bd29-9c4d45ff3327">346bfafb-41a4-4705-9274-1725a8a4651c</_dlc_DocId>
+    <_dlc_DocIdUrl xmlns="aff7d12c-bb71-4270-bd29-9c4d45ff3327">
+      <Url>https://www.groupware.kuleuven.be/sites/hpc/_layouts/15/DocIdRedir.aspx?ID=346bfafb-41a4-4705-9274-1725a8a4651c</Url>
+      <Description>346bfafb-41a4-4705-9274-1725a8a4651c</Description>
+    </_dlc_DocIdUrl>
+  </documentManagement>
+</p:properties>
+</file>
+
+<file path=customXml/item4.xml><?xml version="1.0" encoding="utf-8"?>
+<?mso-contentType ?>
+<spe:Receivers xmlns:spe="http://schemas.microsoft.com/sharepoint/events">
+  <Receiver>
+    <Name>Document ID Generator</Name>
+    <Synchronization>Synchronous</Synchronization>
+    <Type>10001</Type>
+    <SequenceNumber>1000</SequenceNumber>
+    <Assembly>Microsoft.Office.DocumentManagement, Version=14.0.0.0, Culture=neutral, PublicKeyToken=71e9bce111e9429c</Assembly>
+    <Class>Microsoft.Office.DocumentManagement.Internal.DocIdHandler</Class>
+    <Data/>
+    <Filter/>
+  </Receiver>
+  <Receiver>
+    <Name>Document ID Generator</Name>
+    <Synchronization>Synchronous</Synchronization>
+    <Type>10002</Type>
+    <SequenceNumber>1001</SequenceNumber>
+    <Assembly>Microsoft.Office.DocumentManagement, Version=14.0.0.0, Culture=neutral, PublicKeyToken=71e9bce111e9429c</Assembly>
+    <Class>Microsoft.Office.DocumentManagement.Internal.DocIdHandler</Class>
+    <Data/>
+    <Filter/>
+  </Receiver>
+  <Receiver>
+    <Name>Document ID Generator</Name>
+    <Synchronization>Synchronous</Synchronization>
+    <Type>10004</Type>
+    <SequenceNumber>1002</SequenceNumber>
+    <Assembly>Microsoft.Office.DocumentManagement, Version=14.0.0.0, Culture=neutral, PublicKeyToken=71e9bce111e9429c</Assembly>
+    <Class>Microsoft.Office.DocumentManagement.Internal.DocIdHandler</Class>
+    <Data/>
+    <Filter/>
+  </Receiver>
+  <Receiver>
+    <Name>Document ID Generator</Name>
+    <Synchronization>Synchronous</Synchronization>
+    <Type>10006</Type>
+    <SequenceNumber>1003</SequenceNumber>
+    <Assembly>Microsoft.Office.DocumentManagement, Version=14.0.0.0, Culture=neutral, PublicKeyToken=71e9bce111e9429c</Assembly>
+    <Class>Microsoft.Office.DocumentManagement.Internal.DocIdHandler</Class>
+    <Data/>
+    <Filter/>
+  </Receiver>
+</spe:Receivers>
+</file>
+
 <file path=customXml/item5.xml><?xml version="1.0" encoding="utf-8"?>
 <?mso-contentType ?>
-<FormTemplates xmlns="http://schemas.microsoft.com/sharepoint/v3/contenttype/forms">
-  <Display>DocumentLibraryForm</Display>
-  <Edit>DocumentLibraryForm</Edit>
-  <New>DocumentLibraryForm</New>
-</FormTemplates>
+<customXsn xmlns="http://schemas.microsoft.com/office/2006/metadata/customXsn">
+  <xsnLocation/>
+  <cached>True</cached>
+  <openByDefault>True</openByDefault>
+  <xsnScope>/sites/hpc</xsnScope>
+</customXsn>
 </file>
 
 <file path=customXml/itemProps1.xml><?xml version="1.0" encoding="utf-8"?>
-<ds:datastoreItem xmlns:ds="http://schemas.openxmlformats.org/officeDocument/2006/customXml" ds:itemID="{7732E273-8A47-4E01-AC36-8FF8A6317757}">
+<ds:datastoreItem xmlns:ds="http://schemas.openxmlformats.org/officeDocument/2006/customXml" ds:itemID="{564EE3F2-D13D-4835-816B-74B5A421851B}">
   <ds:schemaRefs>
-    <ds:schemaRef ds:uri="http://schemas.microsoft.com/sharepoint/events"/>
+    <ds:schemaRef ds:uri="http://schemas.microsoft.com/sharepoint/v3/contenttype/forms"/>
   </ds:schemaRefs>
 </ds:datastoreItem>
 </file>
 
 <file path=customXml/itemProps2.xml><?xml version="1.0" encoding="utf-8"?>
-<ds:datastoreItem xmlns:ds="http://schemas.openxmlformats.org/officeDocument/2006/customXml" ds:itemID="{F0EF99C1-AFFA-4072-A3F6-6A9C90E28E63}">
+<ds:datastoreItem xmlns:ds="http://schemas.openxmlformats.org/officeDocument/2006/customXml" ds:itemID="{5D5B35C9-35F5-4278-990B-48710415D639}">
   <ds:schemaRefs>
-    <ds:schemaRef ds:uri="http://schemas.microsoft.com/office/2006/metadata/customXsn"/>
+    <ds:schemaRef ds:uri="http://schemas.microsoft.com/office/2006/metadata/contentType"/>
+    <ds:schemaRef ds:uri="http://schemas.microsoft.com/office/2006/metadata/properties/metaAttributes"/>
+    <ds:schemaRef ds:uri="http://www.w3.org/2001/XMLSchema"/>
+    <ds:schemaRef ds:uri="http://schemas.microsoft.com/office/2006/metadata/properties"/>
+    <ds:schemaRef ds:uri="aff7d12c-bb71-4270-bd29-9c4d45ff3327"/>
+    <ds:schemaRef ds:uri="http://schemas.microsoft.com/office/2006/documentManagement/types"/>
+    <ds:schemaRef ds:uri="http://schemas.microsoft.com/office/infopath/2007/PartnerControls"/>
+    <ds:schemaRef ds:uri="http://schemas.openxmlformats.org/package/2006/metadata/core-properties"/>
+    <ds:schemaRef ds:uri="http://purl.org/dc/elements/1.1/"/>
+    <ds:schemaRef ds:uri="http://purl.org/dc/terms/"/>
+    <ds:schemaRef ds:uri="http://schemas.microsoft.com/internal/obd"/>
   </ds:schemaRefs>
 </ds:datastoreItem>
 </file>
@@ -42222,27 +42206,17 @@
 </file>
 
 <file path=customXml/itemProps4.xml><?xml version="1.0" encoding="utf-8"?>
-<ds:datastoreItem xmlns:ds="http://schemas.openxmlformats.org/officeDocument/2006/customXml" ds:itemID="{5D5B35C9-35F5-4278-990B-48710415D639}">
+<ds:datastoreItem xmlns:ds="http://schemas.openxmlformats.org/officeDocument/2006/customXml" ds:itemID="{7732E273-8A47-4E01-AC36-8FF8A6317757}">
   <ds:schemaRefs>
-    <ds:schemaRef ds:uri="http://schemas.microsoft.com/office/2006/metadata/contentType"/>
-    <ds:schemaRef ds:uri="http://schemas.microsoft.com/office/2006/metadata/properties/metaAttributes"/>
-    <ds:schemaRef ds:uri="http://www.w3.org/2001/XMLSchema"/>
-    <ds:schemaRef ds:uri="http://schemas.microsoft.com/office/2006/metadata/properties"/>
-    <ds:schemaRef ds:uri="aff7d12c-bb71-4270-bd29-9c4d45ff3327"/>
-    <ds:schemaRef ds:uri="http://schemas.microsoft.com/office/2006/documentManagement/types"/>
-    <ds:schemaRef ds:uri="http://schemas.microsoft.com/office/infopath/2007/PartnerControls"/>
-    <ds:schemaRef ds:uri="http://schemas.openxmlformats.org/package/2006/metadata/core-properties"/>
-    <ds:schemaRef ds:uri="http://purl.org/dc/elements/1.1/"/>
-    <ds:schemaRef ds:uri="http://purl.org/dc/terms/"/>
-    <ds:schemaRef ds:uri="http://schemas.microsoft.com/internal/obd"/>
+    <ds:schemaRef ds:uri="http://schemas.microsoft.com/sharepoint/events"/>
   </ds:schemaRefs>
 </ds:datastoreItem>
 </file>
 
 <file path=customXml/itemProps5.xml><?xml version="1.0" encoding="utf-8"?>
-<ds:datastoreItem xmlns:ds="http://schemas.openxmlformats.org/officeDocument/2006/customXml" ds:itemID="{564EE3F2-D13D-4835-816B-74B5A421851B}">
+<ds:datastoreItem xmlns:ds="http://schemas.openxmlformats.org/officeDocument/2006/customXml" ds:itemID="{F0EF99C1-AFFA-4072-A3F6-6A9C90E28E63}">
   <ds:schemaRefs>
-    <ds:schemaRef ds:uri="http://schemas.microsoft.com/sharepoint/v3/contenttype/forms"/>
+    <ds:schemaRef ds:uri="http://schemas.microsoft.com/office/2006/metadata/customXsn"/>
   </ds:schemaRefs>
 </ds:datastoreItem>
 </file>
</xml_diff>

<commit_message>
correcting example repo link
</commit_message>
<xml_diff>
--- a/Slurm_Lunchbox.pptx
+++ b/Slurm_Lunchbox.pptx
@@ -29229,8 +29229,8 @@
         </p:nvSpPr>
         <p:spPr>
           <a:xfrm>
-            <a:off x="6603354" y="296266"/>
-            <a:ext cx="5476885" cy="461665"/>
+            <a:off x="6096000" y="296266"/>
+            <a:ext cx="5984239" cy="461665"/>
           </a:xfrm>
           <a:prstGeom prst="rect">
             <a:avLst/>
@@ -29245,11 +29245,12 @@
           <a:p>
             <a:r>
               <a:rPr lang="nl-BE" sz="2400" dirty="0">
-                <a:hlinkClick r:id="rId2"/>
-              </a:rPr>
-              <a:t>https://github.com/gjbex/slurm_examples</a:t>
-            </a:r>
-            <a:endParaRPr lang="nl-BE" sz="2400" dirty="0"/>
+                <a:solidFill>
+                  <a:schemeClr val="accent1"/>
+                </a:solidFill>
+              </a:rPr>
+              <a:t>https://github.com/hpcleuven/Slurm-lunchbox</a:t>
+            </a:r>
           </a:p>
         </p:txBody>
       </p:sp>
@@ -30406,8 +30407,8 @@
         </p:nvSpPr>
         <p:spPr>
           <a:xfrm>
-            <a:off x="6715116" y="69115"/>
-            <a:ext cx="5476884" cy="830997"/>
+            <a:off x="6096000" y="112557"/>
+            <a:ext cx="6040500" cy="830997"/>
           </a:xfrm>
           <a:prstGeom prst="rect">
             <a:avLst/>
@@ -30422,11 +30423,12 @@
           <a:p>
             <a:r>
               <a:rPr lang="nl-BE" sz="2400" dirty="0">
-                <a:hlinkClick r:id="rId2"/>
-              </a:rPr>
-              <a:t>https://github.com/gjbex/slurm_examples</a:t>
-            </a:r>
-            <a:endParaRPr lang="nl-BE" sz="2400" dirty="0"/>
+                <a:solidFill>
+                  <a:schemeClr val="accent1"/>
+                </a:solidFill>
+              </a:rPr>
+              <a:t>https://github.com/hpcleuven/Slurm-lunchbox</a:t>
+            </a:r>
           </a:p>
           <a:p>
             <a:endParaRPr lang="nl-BE" sz="2400" dirty="0"/>
@@ -31045,8 +31047,8 @@
         </p:nvSpPr>
         <p:spPr>
           <a:xfrm>
-            <a:off x="6715116" y="69115"/>
-            <a:ext cx="5476884" cy="830997"/>
+            <a:off x="6096000" y="108531"/>
+            <a:ext cx="6040500" cy="830997"/>
           </a:xfrm>
           <a:prstGeom prst="rect">
             <a:avLst/>
@@ -31061,11 +31063,12 @@
           <a:p>
             <a:r>
               <a:rPr lang="nl-BE" sz="2400" dirty="0">
-                <a:hlinkClick r:id="rId2"/>
-              </a:rPr>
-              <a:t>https://github.com/gjbex/slurm_examples</a:t>
-            </a:r>
-            <a:endParaRPr lang="nl-BE" sz="2400" dirty="0"/>
+                <a:solidFill>
+                  <a:schemeClr val="accent1"/>
+                </a:solidFill>
+              </a:rPr>
+              <a:t>https://github.com/hpcleuven/Slurm-lunchbox</a:t>
+            </a:r>
           </a:p>
           <a:p>
             <a:endParaRPr lang="nl-BE" sz="2400" dirty="0"/>
@@ -31738,8 +31741,8 @@
         </p:nvSpPr>
         <p:spPr>
           <a:xfrm>
-            <a:off x="6715116" y="69115"/>
-            <a:ext cx="5476884" cy="830997"/>
+            <a:off x="5844850" y="112557"/>
+            <a:ext cx="6040500" cy="830997"/>
           </a:xfrm>
           <a:prstGeom prst="rect">
             <a:avLst/>
@@ -31754,11 +31757,12 @@
           <a:p>
             <a:r>
               <a:rPr lang="nl-BE" sz="2400" dirty="0">
-                <a:hlinkClick r:id="rId2"/>
-              </a:rPr>
-              <a:t>https://github.com/gjbex/slurm_examples</a:t>
-            </a:r>
-            <a:endParaRPr lang="nl-BE" sz="2400" dirty="0"/>
+                <a:solidFill>
+                  <a:schemeClr val="accent1"/>
+                </a:solidFill>
+              </a:rPr>
+              <a:t>https://github.com/hpcleuven/Slurm-lunchbox</a:t>
+            </a:r>
           </a:p>
           <a:p>
             <a:endParaRPr lang="nl-BE" sz="2400" dirty="0"/>

</xml_diff>

<commit_message>
updates provided by Mag
</commit_message>
<xml_diff>
--- a/Slurm_Lunchbox.pptx
+++ b/Slurm_Lunchbox.pptx
@@ -350,7 +350,7 @@
           <a:p>
             <a:fld id="{01F519A0-78CB-4E85-BDD7-0175329041AC}" type="datetimeFigureOut">
               <a:rPr lang="en-US" smtClean="0"/>
-              <a:t>12/6/2022</a:t>
+              <a:t>1/16/2023</a:t>
             </a:fld>
             <a:endParaRPr lang="en-US"/>
           </a:p>
@@ -516,7 +516,7 @@
           <a:p>
             <a:fld id="{337BDF4F-FAE4-4E7A-B003-7AAF79F14F3C}" type="datetimeFigureOut">
               <a:rPr lang="en-US" smtClean="0"/>
-              <a:t>12/6/2022</a:t>
+              <a:t>1/16/2023</a:t>
             </a:fld>
             <a:endParaRPr lang="en-US"/>
           </a:p>
@@ -1653,7 +1653,7 @@
           <a:p>
             <a:fld id="{12D417FB-DB75-4510-8AD7-5416595AADD8}" type="datetime1">
               <a:rPr lang="en-US" smtClean="0"/>
-              <a:t>12/6/2022</a:t>
+              <a:t>1/16/2023</a:t>
             </a:fld>
             <a:endParaRPr lang="en-US"/>
           </a:p>
@@ -2776,7 +2776,7 @@
           <a:p>
             <a:fld id="{A1FA2290-0477-46BB-87A2-28AB474124F3}" type="datetime1">
               <a:rPr lang="nl-BE" smtClean="0"/>
-              <a:t>6/12/2022</a:t>
+              <a:t>16/01/2023</a:t>
             </a:fld>
             <a:endParaRPr lang="nl-BE" dirty="0"/>
           </a:p>
@@ -24144,7 +24144,7 @@
                 <a:ea typeface="新細明體"/>
                 <a:cs typeface="Courier New"/>
               </a:rPr>
-              <a:t>*258.33 + </a:t>
+              <a:t>*141.6666667 + </a:t>
             </a:r>
             <a:r>
               <a:rPr lang="en-US" dirty="0" err="1">
@@ -24166,7 +24166,7 @@
                 <a:ea typeface="新細明體"/>
                 <a:cs typeface="Courier New"/>
               </a:rPr>
-              <a:t>*4.16667 credits</a:t>
+              <a:t>*2.546296296 credits</a:t>
             </a:r>
             <a:br>
               <a:rPr lang="en-US" dirty="0">
@@ -24350,7 +24350,7 @@
                 <a:ea typeface="+mn-lt"/>
                 <a:cs typeface="+mn-lt"/>
               </a:rPr>
-              <a:t>   </a:t>
+              <a:t>  </a:t>
             </a:r>
             <a:r>
               <a:rPr lang="en-US" sz="2000" b="1" dirty="0" err="1">
@@ -24366,7 +24366,7 @@
                 <a:ea typeface="+mn-lt"/>
                 <a:cs typeface="+mn-lt"/>
               </a:rPr>
-              <a:t>=CPU=4.16667,GRES/gpu:a100-sxm4-80gb=258.33333</a:t>
+              <a:t>=CPU=2.546296296,GRES/gpu:a100-sxm4-80gb=141.6666667</a:t>
             </a:r>
             <a:endParaRPr lang="en-US" sz="2000" b="1" dirty="0">
               <a:latin typeface="Courier New"/>
@@ -24567,57 +24567,8 @@
                 <a:ea typeface="新細明體"/>
                 <a:cs typeface="Courier New" panose="02070309020205020404" pitchFamily="49" charset="0"/>
               </a:rPr>
-              <a:t>   worker/1.6.12-foss-2021a    worker/1.6.12-intel-2021a (D)</a:t>
-            </a:r>
-            <a:br>
-              <a:rPr lang="en-US" sz="2000" dirty="0">
-                <a:solidFill>
-                  <a:srgbClr val="4E5865"/>
-                </a:solidFill>
-                <a:latin typeface="Courier New" panose="02070309020205020404" pitchFamily="49" charset="0"/>
-                <a:ea typeface="新細明體"/>
-                <a:cs typeface="Courier New" panose="02070309020205020404" pitchFamily="49" charset="0"/>
-              </a:rPr>
-            </a:br>
-            <a:r>
-              <a:rPr lang="en-US" sz="2000" dirty="0">
-                <a:solidFill>
-                  <a:srgbClr val="4E5865"/>
-                </a:solidFill>
-                <a:latin typeface="Courier New" panose="02070309020205020404" pitchFamily="49" charset="0"/>
-                <a:ea typeface="新細明體"/>
-                <a:cs typeface="Courier New" panose="02070309020205020404" pitchFamily="49" charset="0"/>
-              </a:rPr>
-              <a:t>$ module load worker/1.6.12-intel-2021a</a:t>
-            </a:r>
-            <a:endParaRPr lang="nl-BE" sz="2000" dirty="0">
-              <a:solidFill>
-                <a:srgbClr val="4E5865"/>
-              </a:solidFill>
-              <a:latin typeface="Courier New" panose="02070309020205020404" pitchFamily="49" charset="0"/>
-              <a:ea typeface="新細明體"/>
-              <a:cs typeface="Courier New" panose="02070309020205020404" pitchFamily="49" charset="0"/>
-            </a:endParaRPr>
-          </a:p>
-          <a:p>
-            <a:pPr marL="742950" lvl="1" indent="-342900">
-              <a:buBlip>
-                <a:blip r:embed="rId2"/>
-              </a:buBlip>
-            </a:pPr>
-            <a:endParaRPr lang="nl-BE" dirty="0">
-              <a:solidFill>
-                <a:srgbClr val="4E5865"/>
-              </a:solidFill>
-              <a:ea typeface="新細明體"/>
-            </a:endParaRPr>
-          </a:p>
-          <a:p>
-            <a:pPr marL="742950" lvl="1" indent="-342900">
-              <a:buBlip>
-                <a:blip r:embed="rId2"/>
-              </a:buBlip>
-            </a:pPr>
+              <a:t>   worker/1.6.12-foss-2021a</a:t>
+            </a:r>
             <a:endParaRPr lang="nl-BE" dirty="0">
               <a:solidFill>
                 <a:srgbClr val="4E5865"/>
@@ -25075,7 +25026,7 @@
                   <a:ea typeface="新細明體"/>
                   <a:cs typeface="Courier New" panose="02070309020205020404" pitchFamily="49" charset="0"/>
                 </a:rPr>
-                <a:t>   </a:t>
+                <a:t>    </a:t>
               </a:r>
               <a:r>
                 <a:rPr lang="nl-BE" sz="2000" dirty="0" err="1">
@@ -25135,7 +25086,7 @@
                   <a:ea typeface="新細明體"/>
                   <a:cs typeface="Courier New" panose="02070309020205020404" pitchFamily="49" charset="0"/>
                 </a:rPr>
-                <a:t>   </a:t>
+                <a:t>    </a:t>
               </a:r>
               <a:r>
                 <a:rPr lang="nl-BE" sz="2000" dirty="0" err="1">
@@ -25179,23 +25130,7 @@
                   <a:ea typeface="新細明體"/>
                   <a:cs typeface="Courier New" panose="02070309020205020404" pitchFamily="49" charset="0"/>
                 </a:rPr>
-                <a:t>/1.6.12-intel-2021a-wice</a:t>
-              </a:r>
-            </a:p>
-            <a:p>
-              <a:pPr marL="400050" lvl="1" indent="0">
-                <a:buNone/>
-              </a:pPr>
-              <a:r>
-                <a:rPr lang="nl-BE" sz="2000" dirty="0">
-                  <a:solidFill>
-                    <a:srgbClr val="4E5865"/>
-                  </a:solidFill>
-                  <a:latin typeface="Courier New" panose="02070309020205020404" pitchFamily="49" charset="0"/>
-                  <a:ea typeface="新細明體"/>
-                  <a:cs typeface="Courier New" panose="02070309020205020404" pitchFamily="49" charset="0"/>
-                </a:rPr>
-                <a:t>   </a:t>
+                <a:t>/1.6.12-foss-2021a                    	 </a:t>
               </a:r>
               <a:r>
                 <a:rPr lang="nl-BE" sz="2000" dirty="0" err="1">
@@ -25217,29 +25152,7 @@
                   <a:ea typeface="新細明體"/>
                   <a:cs typeface="Courier New" panose="02070309020205020404" pitchFamily="49" charset="0"/>
                 </a:rPr>
-                <a:t>/1.6.12-foss-2021a          </a:t>
-              </a:r>
-              <a:r>
-                <a:rPr lang="nl-BE" sz="2000" dirty="0" err="1">
-                  <a:solidFill>
-                    <a:srgbClr val="4E5865"/>
-                  </a:solidFill>
-                  <a:latin typeface="Courier New" panose="02070309020205020404" pitchFamily="49" charset="0"/>
-                  <a:ea typeface="新細明體"/>
-                  <a:cs typeface="Courier New" panose="02070309020205020404" pitchFamily="49" charset="0"/>
-                </a:rPr>
-                <a:t>worker</a:t>
-              </a:r>
-              <a:r>
-                <a:rPr lang="nl-BE" sz="2000" dirty="0">
-                  <a:solidFill>
-                    <a:srgbClr val="4E5865"/>
-                  </a:solidFill>
-                  <a:latin typeface="Courier New" panose="02070309020205020404" pitchFamily="49" charset="0"/>
-                  <a:ea typeface="新細明體"/>
-                  <a:cs typeface="Courier New" panose="02070309020205020404" pitchFamily="49" charset="0"/>
-                </a:rPr>
-                <a:t>/1.6.12-intel-2021a       (D)</a:t>
+                <a:t>/1.6.12-intel-2021a  (D)</a:t>
               </a:r>
             </a:p>
             <a:p>
@@ -26287,7 +26200,7 @@
               <a:t>worker</a:t>
             </a:r>
             <a:r>
-              <a:rPr lang="nl-BE" dirty="0">
+              <a:rPr lang="nl-BE">
                 <a:solidFill>
                   <a:srgbClr val="4E5865"/>
                 </a:solidFill>
@@ -26295,8 +26208,16 @@
                 <a:ea typeface="新細明體"/>
                 <a:cs typeface="Courier New" panose="02070309020205020404" pitchFamily="49" charset="0"/>
               </a:rPr>
-              <a:t>/1.6.12-intel-2021a-wice</a:t>
-            </a:r>
+              <a:t>/1.6.12-foss-2021a-wice</a:t>
+            </a:r>
+            <a:endParaRPr lang="nl-BE" dirty="0">
+              <a:solidFill>
+                <a:srgbClr val="4E5865"/>
+              </a:solidFill>
+              <a:latin typeface="Courier New" panose="02070309020205020404" pitchFamily="49" charset="0"/>
+              <a:ea typeface="新細明體"/>
+              <a:cs typeface="Courier New" panose="02070309020205020404" pitchFamily="49" charset="0"/>
+            </a:endParaRPr>
           </a:p>
           <a:p>
             <a:pPr marL="400050" lvl="1" indent="0">
@@ -26742,7 +26663,7 @@
                 <a:ea typeface="新細明體"/>
                 <a:cs typeface="Courier New" panose="02070309020205020404" pitchFamily="49" charset="0"/>
               </a:rPr>
-              <a:t>/1.6.12-intel-2021a</a:t>
+              <a:t>/1.6.12-foss-2021a</a:t>
             </a:r>
           </a:p>
           <a:p>
@@ -41946,15 +41867,6 @@
 </file>
 
 <file path=customXml/item1.xml><?xml version="1.0" encoding="utf-8"?>
-<?mso-contentType ?>
-<FormTemplates xmlns="http://schemas.microsoft.com/sharepoint/v3/contenttype/forms">
-  <Display>DocumentLibraryForm</Display>
-  <Edit>DocumentLibraryForm</Edit>
-  <New>DocumentLibraryForm</New>
-</FormTemplates>
-</file>
-
-<file path=customXml/item2.xml><?xml version="1.0" encoding="utf-8"?>
 <ct:contentTypeSchema xmlns:ct="http://schemas.microsoft.com/office/2006/metadata/contentType" xmlns:ma="http://schemas.microsoft.com/office/2006/metadata/properties/metaAttributes" ct:_="" ma:_="" ma:contentTypeName="Document" ma:contentTypeID="0x010100317C36A1CAF973428CFB8DC9B5B73D030400A741C9874CC89F4CB7C7A5AE62CBCD36" ma:contentTypeVersion="2" ma:contentTypeDescription="" ma:contentTypeScope="" ma:versionID="2a5b37c1a06f9995b1548b8fc9b10188">
   <xsd:schema xmlns:xsd="http://www.w3.org/2001/XMLSchema" xmlns:xs="http://www.w3.org/2001/XMLSchema" xmlns:p="http://schemas.microsoft.com/office/2006/metadata/properties" xmlns:ns2="aff7d12c-bb71-4270-bd29-9c4d45ff3327" targetNamespace="http://schemas.microsoft.com/office/2006/metadata/properties" ma:root="true" ma:fieldsID="535495b15c0addd8af32a03863086e70" ns2:_="">
     <xsd:import namespace="aff7d12c-bb71-4270-bd29-9c4d45ff3327"/>
@@ -42099,19 +42011,7 @@
 </ct:contentTypeSchema>
 </file>
 
-<file path=customXml/item3.xml><?xml version="1.0" encoding="utf-8"?>
-<p:properties xmlns:p="http://schemas.microsoft.com/office/2006/metadata/properties" xmlns:xsi="http://www.w3.org/2001/XMLSchema-instance" xmlns:pc="http://schemas.microsoft.com/office/infopath/2007/PartnerControls">
-  <documentManagement>
-    <_dlc_DocId xmlns="aff7d12c-bb71-4270-bd29-9c4d45ff3327">346bfafb-41a4-4705-9274-1725a8a4651c</_dlc_DocId>
-    <_dlc_DocIdUrl xmlns="aff7d12c-bb71-4270-bd29-9c4d45ff3327">
-      <Url>https://www.groupware.kuleuven.be/sites/hpc/_layouts/15/DocIdRedir.aspx?ID=346bfafb-41a4-4705-9274-1725a8a4651c</Url>
-      <Description>346bfafb-41a4-4705-9274-1725a8a4651c</Description>
-    </_dlc_DocIdUrl>
-  </documentManagement>
-</p:properties>
-</file>
-
-<file path=customXml/item4.xml><?xml version="1.0" encoding="utf-8"?>
+<file path=customXml/item2.xml><?xml version="1.0" encoding="utf-8"?>
 <?mso-contentType ?>
 <spe:Receivers xmlns:spe="http://schemas.microsoft.com/sharepoint/events">
   <Receiver>
@@ -42157,7 +42057,19 @@
 </spe:Receivers>
 </file>
 
-<file path=customXml/item5.xml><?xml version="1.0" encoding="utf-8"?>
+<file path=customXml/item3.xml><?xml version="1.0" encoding="utf-8"?>
+<p:properties xmlns:p="http://schemas.microsoft.com/office/2006/metadata/properties" xmlns:xsi="http://www.w3.org/2001/XMLSchema-instance" xmlns:pc="http://schemas.microsoft.com/office/infopath/2007/PartnerControls">
+  <documentManagement>
+    <_dlc_DocId xmlns="aff7d12c-bb71-4270-bd29-9c4d45ff3327">346bfafb-41a4-4705-9274-1725a8a4651c</_dlc_DocId>
+    <_dlc_DocIdUrl xmlns="aff7d12c-bb71-4270-bd29-9c4d45ff3327">
+      <Url>https://www.groupware.kuleuven.be/sites/hpc/_layouts/15/DocIdRedir.aspx?ID=346bfafb-41a4-4705-9274-1725a8a4651c</Url>
+      <Description>346bfafb-41a4-4705-9274-1725a8a4651c</Description>
+    </_dlc_DocIdUrl>
+  </documentManagement>
+</p:properties>
+</file>
+
+<file path=customXml/item4.xml><?xml version="1.0" encoding="utf-8"?>
 <?mso-contentType ?>
 <customXsn xmlns="http://schemas.microsoft.com/office/2006/metadata/customXsn">
   <xsnLocation/>
@@ -42167,15 +42079,16 @@
 </customXsn>
 </file>
 
-<file path=customXml/itemProps1.xml><?xml version="1.0" encoding="utf-8"?>
-<ds:datastoreItem xmlns:ds="http://schemas.openxmlformats.org/officeDocument/2006/customXml" ds:itemID="{564EE3F2-D13D-4835-816B-74B5A421851B}">
-  <ds:schemaRefs>
-    <ds:schemaRef ds:uri="http://schemas.microsoft.com/sharepoint/v3/contenttype/forms"/>
-  </ds:schemaRefs>
-</ds:datastoreItem>
+<file path=customXml/item5.xml><?xml version="1.0" encoding="utf-8"?>
+<?mso-contentType ?>
+<FormTemplates xmlns="http://schemas.microsoft.com/sharepoint/v3/contenttype/forms">
+  <Display>DocumentLibraryForm</Display>
+  <Edit>DocumentLibraryForm</Edit>
+  <New>DocumentLibraryForm</New>
+</FormTemplates>
 </file>
 
-<file path=customXml/itemProps2.xml><?xml version="1.0" encoding="utf-8"?>
+<file path=customXml/itemProps1.xml><?xml version="1.0" encoding="utf-8"?>
 <ds:datastoreItem xmlns:ds="http://schemas.openxmlformats.org/officeDocument/2006/customXml" ds:itemID="{5D5B35C9-35F5-4278-990B-48710415D639}">
   <ds:schemaRefs>
     <ds:schemaRef ds:uri="http://schemas.microsoft.com/office/2006/metadata/contentType"/>
@@ -42189,6 +42102,14 @@
     <ds:schemaRef ds:uri="http://purl.org/dc/elements/1.1/"/>
     <ds:schemaRef ds:uri="http://purl.org/dc/terms/"/>
     <ds:schemaRef ds:uri="http://schemas.microsoft.com/internal/obd"/>
+  </ds:schemaRefs>
+</ds:datastoreItem>
+</file>
+
+<file path=customXml/itemProps2.xml><?xml version="1.0" encoding="utf-8"?>
+<ds:datastoreItem xmlns:ds="http://schemas.openxmlformats.org/officeDocument/2006/customXml" ds:itemID="{7732E273-8A47-4E01-AC36-8FF8A6317757}">
+  <ds:schemaRefs>
+    <ds:schemaRef ds:uri="http://schemas.microsoft.com/sharepoint/events"/>
   </ds:schemaRefs>
 </ds:datastoreItem>
 </file>
@@ -42210,17 +42131,17 @@
 </file>
 
 <file path=customXml/itemProps4.xml><?xml version="1.0" encoding="utf-8"?>
-<ds:datastoreItem xmlns:ds="http://schemas.openxmlformats.org/officeDocument/2006/customXml" ds:itemID="{7732E273-8A47-4E01-AC36-8FF8A6317757}">
+<ds:datastoreItem xmlns:ds="http://schemas.openxmlformats.org/officeDocument/2006/customXml" ds:itemID="{F0EF99C1-AFFA-4072-A3F6-6A9C90E28E63}">
   <ds:schemaRefs>
-    <ds:schemaRef ds:uri="http://schemas.microsoft.com/sharepoint/events"/>
+    <ds:schemaRef ds:uri="http://schemas.microsoft.com/office/2006/metadata/customXsn"/>
   </ds:schemaRefs>
 </ds:datastoreItem>
 </file>
 
 <file path=customXml/itemProps5.xml><?xml version="1.0" encoding="utf-8"?>
-<ds:datastoreItem xmlns:ds="http://schemas.openxmlformats.org/officeDocument/2006/customXml" ds:itemID="{F0EF99C1-AFFA-4072-A3F6-6A9C90E28E63}">
+<ds:datastoreItem xmlns:ds="http://schemas.openxmlformats.org/officeDocument/2006/customXml" ds:itemID="{564EE3F2-D13D-4835-816B-74B5A421851B}">
   <ds:schemaRefs>
-    <ds:schemaRef ds:uri="http://schemas.microsoft.com/office/2006/metadata/customXsn"/>
+    <ds:schemaRef ds:uri="http://schemas.microsoft.com/sharepoint/v3/contenttype/forms"/>
   </ds:schemaRefs>
 </ds:datastoreItem>
 </file>
</xml_diff>